<commit_message>
removing a few slides from nc state talk
</commit_message>
<xml_diff>
--- a/doc/NCState_seminar_2014/Profugus.pptx
+++ b/doc/NCState_seminar_2014/Profugus.pptx
@@ -1626,7 +1626,6 @@
               <a:rPr lang="en-US" smtClean="0"/>
               <a:t>Click to edit Master title style</a:t>
             </a:r>
-            <a:endParaRPr lang="en-US" smtClean="0"/>
           </a:p>
         </p:txBody>
       </p:sp>
@@ -1670,7 +1669,7 @@
           <a:p>
             <a:fld id="{CC0F9404-425B-2243-8AD0-981919EE03FA}" type="datetimeFigureOut">
               <a:rPr lang="en-US" smtClean="0"/>
-              <a:t>6/2/14</a:t>
+              <a:t>11/3/14</a:t>
             </a:fld>
             <a:endParaRPr lang="en-US"/>
           </a:p>
@@ -2513,7 +2512,7 @@
         </p:blipFill>
         <p:spPr>
           <a:xfrm>
-            <a:off x="6105224" y="1886706"/>
+            <a:off x="6105224" y="1875663"/>
             <a:ext cx="3038776" cy="2498580"/>
           </a:xfrm>
           <a:prstGeom prst="rect">
@@ -2748,7 +2747,6 @@
               <a:rPr lang="en-US" dirty="0" smtClean="0"/>
               <a:t>Provide open-source kernels that effectively capture the algorithmic features of the full applications </a:t>
             </a:r>
-            <a:endParaRPr lang="en-US" dirty="0" smtClean="0"/>
           </a:p>
         </p:txBody>
       </p:sp>
@@ -2907,13 +2905,8 @@
             </a:r>
             <a:r>
               <a:rPr lang="en-US" dirty="0" smtClean="0"/>
-              <a:t> </a:t>
-            </a:r>
-            <a:r>
-              <a:rPr lang="en-US" dirty="0" smtClean="0"/>
-              <a:t>solver and Shift’s Monte Carlo kernel:</a:t>
-            </a:r>
-            <a:endParaRPr lang="en-US" dirty="0" smtClean="0"/>
+              <a:t> solver and Shift’s Monte Carlo kernel:</a:t>
+            </a:r>
           </a:p>
           <a:p>
             <a:pPr lvl="1"/>
@@ -2979,11 +2972,7 @@
             <a:pPr lvl="1"/>
             <a:r>
               <a:rPr lang="en-US" dirty="0" smtClean="0"/>
-              <a:t>Generic material cross section libraries are provided that capture the salient physics of reactor </a:t>
-            </a:r>
-            <a:r>
-              <a:rPr lang="en-US" dirty="0" smtClean="0"/>
-              <a:t>simulations</a:t>
+              <a:t>Generic material cross section libraries are provided that capture the salient physics of reactor simulations</a:t>
             </a:r>
           </a:p>
           <a:p>
@@ -2992,7 +2981,6 @@
               <a:rPr lang="en-US" dirty="0" smtClean="0"/>
               <a:t>Monte Carlo domain replication parallelism</a:t>
             </a:r>
-            <a:endParaRPr lang="en-US" dirty="0" smtClean="0"/>
           </a:p>
           <a:p>
             <a:endParaRPr lang="en-US" dirty="0"/>
@@ -3310,7 +3298,7 @@
           <a:graphicData uri="http://schemas.openxmlformats.org/presentationml/2006/ole">
             <mc:AlternateContent xmlns:mc="http://schemas.openxmlformats.org/markup-compatibility/2006">
               <mc:Choice xmlns:v="urn:schemas-microsoft-com:vml" Requires="v">
-                <p:oleObj spid="_x0000_s1042" name="Equation" r:id="rId3" imgW="1955800" imgH="1612900" progId="Equation.3">
+                <p:oleObj spid="_x0000_s1047" name="Equation" r:id="rId3" imgW="1955800" imgH="1612900" progId="Equation.3">
                   <p:embed/>
                 </p:oleObj>
               </mc:Choice>
@@ -3461,7 +3449,7 @@
           <a:graphicData uri="http://schemas.openxmlformats.org/presentationml/2006/ole">
             <mc:AlternateContent xmlns:mc="http://schemas.openxmlformats.org/markup-compatibility/2006">
               <mc:Choice xmlns:v="urn:schemas-microsoft-com:vml" Requires="v">
-                <p:oleObj spid="_x0000_s1043" name="Equation" r:id="rId5" imgW="1955800" imgH="1600200" progId="Equation.3">
+                <p:oleObj spid="_x0000_s1048" name="Equation" r:id="rId5" imgW="1955800" imgH="1600200" progId="Equation.3">
                   <p:embed/>
                 </p:oleObj>
               </mc:Choice>
@@ -4085,17 +4073,8 @@
             <a:pPr lvl="1"/>
             <a:r>
               <a:rPr lang="en-US" sz="2000" dirty="0" smtClean="0"/>
-              <a:t>MCNP CE physics </a:t>
-            </a:r>
-            <a:r>
-              <a:rPr lang="en-US" sz="2000" dirty="0" smtClean="0"/>
-              <a:t>(</a:t>
-            </a:r>
-            <a:r>
-              <a:rPr lang="en-US" sz="2000" dirty="0" smtClean="0"/>
-              <a:t>incomplete</a:t>
-            </a:r>
-            <a:endParaRPr lang="en-US" sz="2000" dirty="0" smtClean="0"/>
+              <a:t>MCNP CE physics (incomplete</a:t>
+            </a:r>
           </a:p>
           <a:p>
             <a:r>
@@ -4114,11 +4093,7 @@
             <a:pPr lvl="1"/>
             <a:r>
               <a:rPr lang="en-US" sz="2000" dirty="0" smtClean="0"/>
-              <a:t>Atlas/KENO </a:t>
-            </a:r>
-            <a:r>
-              <a:rPr lang="en-US" sz="2000" dirty="0" smtClean="0"/>
-              <a:t>geometry (in progress)</a:t>
+              <a:t>Atlas/KENO geometry (in progress)</a:t>
             </a:r>
           </a:p>
           <a:p>

</xml_diff>